<commit_message>
Replace Courier New with Consolas
</commit_message>
<xml_diff>
--- a/test/original/sample4.pptx
+++ b/test/original/sample4.pptx
@@ -7,6 +7,7 @@
   <p:sldIdLst>
     <p:sldId id="257" r:id="rId2"/>
     <p:sldId id="256" r:id="rId3"/>
+    <p:sldId id="258" r:id="rId4"/>
   </p:sldIdLst>
   <p:sldSz cx="12192000" cy="6858000"/>
   <p:notesSz cx="6858000" cy="9144000"/>
@@ -260,7 +261,7 @@
           <a:p>
             <a:fld id="{766D20D2-48C5-4420-B145-354427682592}" type="datetimeFigureOut">
               <a:rPr kumimoji="1" lang="ja-JP" altLang="en-US" smtClean="0"/>
-              <a:t>2023/3/23</a:t>
+              <a:t>2023/3/27</a:t>
             </a:fld>
             <a:endParaRPr kumimoji="1" lang="ja-JP" altLang="en-US"/>
           </a:p>
@@ -490,7 +491,7 @@
           <a:p>
             <a:fld id="{766D20D2-48C5-4420-B145-354427682592}" type="datetimeFigureOut">
               <a:rPr kumimoji="1" lang="ja-JP" altLang="en-US" smtClean="0"/>
-              <a:t>2023/3/23</a:t>
+              <a:t>2023/3/27</a:t>
             </a:fld>
             <a:endParaRPr kumimoji="1" lang="ja-JP" altLang="en-US"/>
           </a:p>
@@ -730,7 +731,7 @@
           <a:p>
             <a:fld id="{766D20D2-48C5-4420-B145-354427682592}" type="datetimeFigureOut">
               <a:rPr kumimoji="1" lang="ja-JP" altLang="en-US" smtClean="0"/>
-              <a:t>2023/3/23</a:t>
+              <a:t>2023/3/27</a:t>
             </a:fld>
             <a:endParaRPr kumimoji="1" lang="ja-JP" altLang="en-US"/>
           </a:p>
@@ -960,7 +961,7 @@
           <a:p>
             <a:fld id="{766D20D2-48C5-4420-B145-354427682592}" type="datetimeFigureOut">
               <a:rPr kumimoji="1" lang="ja-JP" altLang="en-US" smtClean="0"/>
-              <a:t>2023/3/23</a:t>
+              <a:t>2023/3/27</a:t>
             </a:fld>
             <a:endParaRPr kumimoji="1" lang="ja-JP" altLang="en-US"/>
           </a:p>
@@ -1235,7 +1236,7 @@
           <a:p>
             <a:fld id="{766D20D2-48C5-4420-B145-354427682592}" type="datetimeFigureOut">
               <a:rPr kumimoji="1" lang="ja-JP" altLang="en-US" smtClean="0"/>
-              <a:t>2023/3/23</a:t>
+              <a:t>2023/3/27</a:t>
             </a:fld>
             <a:endParaRPr kumimoji="1" lang="ja-JP" altLang="en-US"/>
           </a:p>
@@ -1564,7 +1565,7 @@
           <a:p>
             <a:fld id="{766D20D2-48C5-4420-B145-354427682592}" type="datetimeFigureOut">
               <a:rPr kumimoji="1" lang="ja-JP" altLang="en-US" smtClean="0"/>
-              <a:t>2023/3/23</a:t>
+              <a:t>2023/3/27</a:t>
             </a:fld>
             <a:endParaRPr kumimoji="1" lang="ja-JP" altLang="en-US"/>
           </a:p>
@@ -2040,7 +2041,7 @@
           <a:p>
             <a:fld id="{766D20D2-48C5-4420-B145-354427682592}" type="datetimeFigureOut">
               <a:rPr kumimoji="1" lang="ja-JP" altLang="en-US" smtClean="0"/>
-              <a:t>2023/3/23</a:t>
+              <a:t>2023/3/27</a:t>
             </a:fld>
             <a:endParaRPr kumimoji="1" lang="ja-JP" altLang="en-US"/>
           </a:p>
@@ -2181,7 +2182,7 @@
           <a:p>
             <a:fld id="{766D20D2-48C5-4420-B145-354427682592}" type="datetimeFigureOut">
               <a:rPr kumimoji="1" lang="ja-JP" altLang="en-US" smtClean="0"/>
-              <a:t>2023/3/23</a:t>
+              <a:t>2023/3/27</a:t>
             </a:fld>
             <a:endParaRPr kumimoji="1" lang="ja-JP" altLang="en-US"/>
           </a:p>
@@ -2294,7 +2295,7 @@
           <a:p>
             <a:fld id="{766D20D2-48C5-4420-B145-354427682592}" type="datetimeFigureOut">
               <a:rPr kumimoji="1" lang="ja-JP" altLang="en-US" smtClean="0"/>
-              <a:t>2023/3/23</a:t>
+              <a:t>2023/3/27</a:t>
             </a:fld>
             <a:endParaRPr kumimoji="1" lang="ja-JP" altLang="en-US"/>
           </a:p>
@@ -2637,7 +2638,7 @@
           <a:p>
             <a:fld id="{766D20D2-48C5-4420-B145-354427682592}" type="datetimeFigureOut">
               <a:rPr kumimoji="1" lang="ja-JP" altLang="en-US" smtClean="0"/>
-              <a:t>2023/3/23</a:t>
+              <a:t>2023/3/27</a:t>
             </a:fld>
             <a:endParaRPr kumimoji="1" lang="ja-JP" altLang="en-US"/>
           </a:p>
@@ -2925,7 +2926,7 @@
           <a:p>
             <a:fld id="{766D20D2-48C5-4420-B145-354427682592}" type="datetimeFigureOut">
               <a:rPr kumimoji="1" lang="ja-JP" altLang="en-US" smtClean="0"/>
-              <a:t>2023/3/23</a:t>
+              <a:t>2023/3/27</a:t>
             </a:fld>
             <a:endParaRPr kumimoji="1" lang="ja-JP" altLang="en-US"/>
           </a:p>
@@ -3198,7 +3199,7 @@
           <a:p>
             <a:fld id="{766D20D2-48C5-4420-B145-354427682592}" type="datetimeFigureOut">
               <a:rPr kumimoji="1" lang="ja-JP" altLang="en-US" smtClean="0"/>
-              <a:t>2023/3/23</a:t>
+              <a:t>2023/3/27</a:t>
             </a:fld>
             <a:endParaRPr kumimoji="1" lang="ja-JP" altLang="en-US"/>
           </a:p>
@@ -3920,6 +3921,192 @@
 </p:sld>
 </file>
 
+<file path=ppt/slides/slide3.xml><?xml version="1.0" encoding="utf-8"?>
+<p:sld xmlns:a="http://schemas.openxmlformats.org/drawingml/2006/main" xmlns:r="http://schemas.openxmlformats.org/officeDocument/2006/relationships" xmlns:p="http://schemas.openxmlformats.org/presentationml/2006/main">
+  <p:cSld>
+    <p:spTree>
+      <p:nvGrpSpPr>
+        <p:cNvPr id="1" name=""/>
+        <p:cNvGrpSpPr/>
+        <p:nvPr/>
+      </p:nvGrpSpPr>
+      <p:grpSpPr>
+        <a:xfrm>
+          <a:off x="0" y="0"/>
+          <a:ext cx="0" cy="0"/>
+          <a:chOff x="0" y="0"/>
+          <a:chExt cx="0" cy="0"/>
+        </a:xfrm>
+      </p:grpSpPr>
+      <p:sp>
+        <p:nvSpPr>
+          <p:cNvPr id="4" name="タイトル 3">
+            <a:extLst>
+              <a:ext uri="{FF2B5EF4-FFF2-40B4-BE49-F238E27FC236}">
+                <a16:creationId xmlns:a16="http://schemas.microsoft.com/office/drawing/2014/main" id="{3CDC556B-5A2B-4AA9-8FDD-6CB95F20CFCA}"/>
+              </a:ext>
+            </a:extLst>
+          </p:cNvPr>
+          <p:cNvSpPr>
+            <a:spLocks noGrp="1"/>
+          </p:cNvSpPr>
+          <p:nvPr>
+            <p:ph type="title"/>
+          </p:nvPr>
+        </p:nvSpPr>
+        <p:spPr/>
+        <p:txBody>
+          <a:bodyPr/>
+          <a:lstStyle/>
+          <a:p>
+            <a:r>
+              <a:rPr lang="ja-JP" altLang="en-US" dirty="0">
+                <a:latin typeface="Constantia" panose="02030602050306030303" pitchFamily="18" charset="0"/>
+                <a:ea typeface="HGS明朝E" panose="02020900000000000000" pitchFamily="18" charset="-128"/>
+              </a:rPr>
+              <a:t>コードの</a:t>
+            </a:r>
+            <a:r>
+              <a:rPr lang="en-US" altLang="ja-JP" dirty="0">
+                <a:latin typeface="Constantia" panose="02030602050306030303" pitchFamily="18" charset="0"/>
+                <a:ea typeface="HGS明朝E" panose="02020900000000000000" pitchFamily="18" charset="-128"/>
+              </a:rPr>
+              <a:t>Test</a:t>
+            </a:r>
+            <a:endParaRPr lang="ja-JP" altLang="en-US" dirty="0">
+              <a:latin typeface="Constantia" panose="02030602050306030303" pitchFamily="18" charset="0"/>
+              <a:ea typeface="+mn-ea"/>
+            </a:endParaRPr>
+          </a:p>
+        </p:txBody>
+      </p:sp>
+      <p:sp>
+        <p:nvSpPr>
+          <p:cNvPr id="5" name="コンテンツ プレースホルダー 4">
+            <a:extLst>
+              <a:ext uri="{FF2B5EF4-FFF2-40B4-BE49-F238E27FC236}">
+                <a16:creationId xmlns:a16="http://schemas.microsoft.com/office/drawing/2014/main" id="{8AD0E84A-33B4-4B7E-A8C4-E1F6C6DEA521}"/>
+              </a:ext>
+            </a:extLst>
+          </p:cNvPr>
+          <p:cNvSpPr>
+            <a:spLocks noGrp="1"/>
+          </p:cNvSpPr>
+          <p:nvPr>
+            <p:ph idx="1"/>
+          </p:nvPr>
+        </p:nvSpPr>
+        <p:spPr/>
+        <p:txBody>
+          <a:bodyPr/>
+          <a:lstStyle/>
+          <a:p>
+            <a:pPr marL="0" indent="0">
+              <a:buNone/>
+            </a:pPr>
+            <a:r>
+              <a:rPr lang="en-US" altLang="ja-JP" dirty="0">
+                <a:latin typeface="Courier New" panose="02070309020205020404" pitchFamily="49" charset="0"/>
+                <a:cs typeface="Courier New" panose="02070309020205020404" pitchFamily="49" charset="0"/>
+              </a:rPr>
+              <a:t>public class HelloWorld {</a:t>
+            </a:r>
+          </a:p>
+          <a:p>
+            <a:pPr marL="0" indent="0">
+              <a:buNone/>
+            </a:pPr>
+            <a:r>
+              <a:rPr lang="en-US" altLang="ja-JP" dirty="0">
+                <a:latin typeface="Courier New" panose="02070309020205020404" pitchFamily="49" charset="0"/>
+                <a:cs typeface="Courier New" panose="02070309020205020404" pitchFamily="49" charset="0"/>
+              </a:rPr>
+              <a:t>    public static void main (String[] </a:t>
+            </a:r>
+            <a:r>
+              <a:rPr lang="en-US" altLang="ja-JP" dirty="0" err="1">
+                <a:latin typeface="Courier New" panose="02070309020205020404" pitchFamily="49" charset="0"/>
+                <a:cs typeface="Courier New" panose="02070309020205020404" pitchFamily="49" charset="0"/>
+              </a:rPr>
+              <a:t>args</a:t>
+            </a:r>
+            <a:r>
+              <a:rPr lang="en-US" altLang="ja-JP" dirty="0">
+                <a:latin typeface="Courier New" panose="02070309020205020404" pitchFamily="49" charset="0"/>
+                <a:cs typeface="Courier New" panose="02070309020205020404" pitchFamily="49" charset="0"/>
+              </a:rPr>
+              <a:t>) {</a:t>
+            </a:r>
+          </a:p>
+          <a:p>
+            <a:pPr marL="0" indent="0">
+              <a:buNone/>
+            </a:pPr>
+            <a:r>
+              <a:rPr lang="en-US" altLang="ja-JP" dirty="0">
+                <a:latin typeface="Courier New" panose="02070309020205020404" pitchFamily="49" charset="0"/>
+                <a:cs typeface="Courier New" panose="02070309020205020404" pitchFamily="49" charset="0"/>
+              </a:rPr>
+              <a:t>        </a:t>
+            </a:r>
+            <a:r>
+              <a:rPr lang="en-US" altLang="ja-JP" dirty="0" err="1">
+                <a:latin typeface="Courier New" panose="02070309020205020404" pitchFamily="49" charset="0"/>
+                <a:cs typeface="Courier New" panose="02070309020205020404" pitchFamily="49" charset="0"/>
+              </a:rPr>
+              <a:t>System.out.println</a:t>
+            </a:r>
+            <a:r>
+              <a:rPr lang="en-US" altLang="ja-JP" dirty="0">
+                <a:latin typeface="Courier New" panose="02070309020205020404" pitchFamily="49" charset="0"/>
+                <a:cs typeface="Courier New" panose="02070309020205020404" pitchFamily="49" charset="0"/>
+              </a:rPr>
+              <a:t>("Hello World !!");</a:t>
+            </a:r>
+          </a:p>
+          <a:p>
+            <a:pPr marL="0" indent="0">
+              <a:buNone/>
+            </a:pPr>
+            <a:r>
+              <a:rPr lang="en-US" altLang="ja-JP" dirty="0">
+                <a:latin typeface="Courier New" panose="02070309020205020404" pitchFamily="49" charset="0"/>
+                <a:cs typeface="Courier New" panose="02070309020205020404" pitchFamily="49" charset="0"/>
+              </a:rPr>
+              <a:t>    }</a:t>
+            </a:r>
+          </a:p>
+          <a:p>
+            <a:pPr marL="0" indent="0">
+              <a:buNone/>
+            </a:pPr>
+            <a:r>
+              <a:rPr lang="en-US" altLang="ja-JP" dirty="0">
+                <a:latin typeface="Courier New" panose="02070309020205020404" pitchFamily="49" charset="0"/>
+                <a:cs typeface="Courier New" panose="02070309020205020404" pitchFamily="49" charset="0"/>
+              </a:rPr>
+              <a:t>}</a:t>
+            </a:r>
+            <a:endParaRPr lang="ja-JP" altLang="en-US" dirty="0">
+              <a:latin typeface="Courier New" panose="02070309020205020404" pitchFamily="49" charset="0"/>
+              <a:cs typeface="Courier New" panose="02070309020205020404" pitchFamily="49" charset="0"/>
+            </a:endParaRPr>
+          </a:p>
+        </p:txBody>
+      </p:sp>
+    </p:spTree>
+    <p:extLst>
+      <p:ext uri="{BB962C8B-B14F-4D97-AF65-F5344CB8AC3E}">
+        <p14:creationId xmlns:p14="http://schemas.microsoft.com/office/powerpoint/2010/main" val="205874688"/>
+      </p:ext>
+    </p:extLst>
+  </p:cSld>
+  <p:clrMapOvr>
+    <a:masterClrMapping/>
+  </p:clrMapOvr>
+</p:sld>
+</file>
+
 <file path=ppt/theme/theme1.xml><?xml version="1.0" encoding="utf-8"?>
 <a:theme xmlns:a="http://schemas.openxmlformats.org/drawingml/2006/main" name="Office テーマ">
   <a:themeElements>

</xml_diff>